<commit_message>
+ Modified Day 7-2 slides and diagrams.
</commit_message>
<xml_diff>
--- a/Slides/Day_7_2.pptx
+++ b/Slides/Day_7_2.pptx
@@ -8496,7 +8496,7 @@
                 <a:latin typeface="Arial" panose="020B0604020202020204" pitchFamily="34" charset="0"/>
                 <a:cs typeface="Arial" panose="020B0604020202020204" pitchFamily="34" charset="0"/>
               </a:rPr>
-              <a:t>taglib: Nhập thư viện thẻ cho JSP</a:t>
+              <a:t>taglib (thường dùng): Nhập thư viện thẻ cho JSP</a:t>
             </a:r>
           </a:p>
         </p:txBody>
@@ -13056,7 +13056,7 @@
                 <a:latin typeface="Arial" panose="020B0604020202020204" pitchFamily="34" charset="0"/>
                 <a:cs typeface="Arial" panose="020B0604020202020204" pitchFamily="34" charset="0"/>
               </a:rPr>
-              <a:t>View: Là những giao diện người dùng của ứng dụng, hay các trang web. Chúng chịu trách nhiệm: Hiển thị dữ liệu từ những dữ liệu được cung cấp bởi Controller.</a:t>
+              <a:t>View: Là những giao diện người dùng của ứng dụng, hay các trang web. Chúng chịu trách nhiệm: Hiển thị dữ liệu từ những dữ liệu được cung cấp bởi Controller, tiếp nhận tương tác của người dùng.</a:t>
             </a:r>
           </a:p>
         </p:txBody>

</xml_diff>